<commit_message>
Update media files and README.md
</commit_message>
<xml_diff>
--- a/Media/Overview.pptx
+++ b/Media/Overview.pptx
@@ -1438,7 +1438,7 @@
   <dgm:whole/>
   <dgm:extLst>
     <a:ext uri="http://schemas.microsoft.com/office/drawing/2008/diagram">
-      <dsp:dataModelExt xmlns:dsp="http://schemas.microsoft.com/office/drawing/2008/diagram" relId="rId7" minVer="http://schemas.openxmlformats.org/drawingml/2006/diagram"/>
+      <dsp:dataModelExt xmlns:dsp="http://schemas.microsoft.com/office/drawing/2008/diagram" relId="rId8" minVer="http://schemas.openxmlformats.org/drawingml/2006/diagram"/>
     </a:ext>
   </dgm:extLst>
 </dgm:dataModel>
@@ -3937,22 +3937,7 @@
           <a:bodyPr/>
           <a:lstStyle/>
           <a:p>
-            <a:r>
-              <a:rPr lang="en-US" dirty="0"/>
-              <a:t>https://learn.microsoft.com/en-us/entra/identity-platform/custom-extension-overview</a:t>
-            </a:r>
-          </a:p>
-          <a:p>
-            <a:r>
-              <a:rPr lang="en-US" dirty="0"/>
-              <a:t>https://learn.microsoft.com/en-us/entra/external-id/customers/concept-custom-extensions</a:t>
-            </a:r>
-          </a:p>
-          <a:p>
-            <a:endParaRPr lang="en-US" dirty="0"/>
-          </a:p>
-          <a:p>
-            <a:endParaRPr lang="en-US" dirty="0"/>
+            <a:endParaRPr lang="en-US"/>
           </a:p>
         </p:txBody>
       </p:sp>
@@ -3973,7 +3958,7 @@
           <a:p>
             <a:fld id="{FFCBA6C1-B5D0-435C-97B3-E993F8FCD822}" type="slidenum">
               <a:rPr lang="en-US" smtClean="0"/>
-              <a:t>2</a:t>
+              <a:t>1</a:t>
             </a:fld>
             <a:endParaRPr lang="en-US"/>
           </a:p>
@@ -3982,7 +3967,7 @@
     </p:spTree>
     <p:extLst>
       <p:ext uri="{BB962C8B-B14F-4D97-AF65-F5344CB8AC3E}">
-        <p14:creationId xmlns:p14="http://schemas.microsoft.com/office/powerpoint/2010/main" val="3398968593"/>
+        <p14:creationId xmlns:p14="http://schemas.microsoft.com/office/powerpoint/2010/main" val="2617784422"/>
       </p:ext>
     </p:extLst>
   </p:cSld>
@@ -4037,9 +4022,328 @@
           <a:lstStyle/>
           <a:p>
             <a:r>
+              <a:rPr lang="en-US" dirty="0">
+                <a:hlinkClick r:id="rId3"/>
+              </a:rPr>
+              <a:t>Custom authentication extensions overview - Microsoft identity platform | Microsoft Learn</a:t>
+            </a:r>
+            <a:r>
               <a:rPr lang="en-US" dirty="0"/>
-              <a:t>https://www.youtube.com/watch?v=fxQGVIwX8_4&amp;list=PL3ZTgFEc7Lythpts59O9KOVuEDLWJLLmA&amp;index=7</a:t>
-            </a:r>
+              <a:t>: </a:t>
+            </a:r>
+          </a:p>
+          <a:p>
+            <a:r>
+              <a:rPr lang="en-US" dirty="0"/>
+              <a:t>https://learn.microsoft.com/en-us/entra/identity-platform/custom-extension-overview</a:t>
+            </a:r>
+          </a:p>
+          <a:p>
+            <a:endParaRPr lang="en-US" dirty="0"/>
+          </a:p>
+          <a:p>
+            <a:endParaRPr lang="en-US" dirty="0"/>
+          </a:p>
+          <a:p>
+            <a:r>
+              <a:rPr lang="en-US" dirty="0">
+                <a:hlinkClick r:id="rId4"/>
+              </a:rPr>
+              <a:t>Custom extensions in a customer tenant - Microsoft </a:t>
+            </a:r>
+            <a:r>
+              <a:rPr lang="en-US" dirty="0" err="1">
+                <a:hlinkClick r:id="rId4"/>
+              </a:rPr>
+              <a:t>Entra</a:t>
+            </a:r>
+            <a:r>
+              <a:rPr lang="en-US" dirty="0">
+                <a:hlinkClick r:id="rId4"/>
+              </a:rPr>
+              <a:t> External ID | Microsoft Learn</a:t>
+            </a:r>
+            <a:r>
+              <a:rPr lang="en-US" dirty="0"/>
+              <a:t>: </a:t>
+            </a:r>
+          </a:p>
+          <a:p>
+            <a:r>
+              <a:rPr lang="en-US" dirty="0"/>
+              <a:t>https://learn.microsoft.com/en-us/entra/external-id/customers/concept-custom-extensions</a:t>
+            </a:r>
+          </a:p>
+          <a:p>
+            <a:endParaRPr lang="en-US" dirty="0"/>
+          </a:p>
+          <a:p>
+            <a:endParaRPr lang="en-US" dirty="0"/>
+          </a:p>
+        </p:txBody>
+      </p:sp>
+      <p:sp>
+        <p:nvSpPr>
+          <p:cNvPr id="4" name="Slide Number Placeholder 3"/>
+          <p:cNvSpPr>
+            <a:spLocks noGrp="1"/>
+          </p:cNvSpPr>
+          <p:nvPr>
+            <p:ph type="sldNum" sz="quarter" idx="5"/>
+          </p:nvPr>
+        </p:nvSpPr>
+        <p:spPr/>
+        <p:txBody>
+          <a:bodyPr/>
+          <a:lstStyle/>
+          <a:p>
+            <a:fld id="{FFCBA6C1-B5D0-435C-97B3-E993F8FCD822}" type="slidenum">
+              <a:rPr lang="en-US" smtClean="0"/>
+              <a:t>2</a:t>
+            </a:fld>
+            <a:endParaRPr lang="en-US"/>
+          </a:p>
+        </p:txBody>
+      </p:sp>
+    </p:spTree>
+    <p:extLst>
+      <p:ext uri="{BB962C8B-B14F-4D97-AF65-F5344CB8AC3E}">
+        <p14:creationId xmlns:p14="http://schemas.microsoft.com/office/powerpoint/2010/main" val="3398968593"/>
+      </p:ext>
+    </p:extLst>
+  </p:cSld>
+  <p:clrMapOvr>
+    <a:masterClrMapping/>
+  </p:clrMapOvr>
+</p:notes>
+</file>
+
+<file path=ppt/notesSlides/notesSlide3.xml><?xml version="1.0" encoding="utf-8"?>
+<p:notes xmlns:a="http://schemas.openxmlformats.org/drawingml/2006/main" xmlns:r="http://schemas.openxmlformats.org/officeDocument/2006/relationships" xmlns:p="http://schemas.openxmlformats.org/presentationml/2006/main">
+  <p:cSld>
+    <p:spTree>
+      <p:nvGrpSpPr>
+        <p:cNvPr id="1" name=""/>
+        <p:cNvGrpSpPr/>
+        <p:nvPr/>
+      </p:nvGrpSpPr>
+      <p:grpSpPr>
+        <a:xfrm>
+          <a:off x="0" y="0"/>
+          <a:ext cx="0" cy="0"/>
+          <a:chOff x="0" y="0"/>
+          <a:chExt cx="0" cy="0"/>
+        </a:xfrm>
+      </p:grpSpPr>
+      <p:sp>
+        <p:nvSpPr>
+          <p:cNvPr id="2" name="Slide Image Placeholder 1"/>
+          <p:cNvSpPr>
+            <a:spLocks noGrp="1" noRot="1" noChangeAspect="1"/>
+          </p:cNvSpPr>
+          <p:nvPr>
+            <p:ph type="sldImg"/>
+          </p:nvPr>
+        </p:nvSpPr>
+        <p:spPr/>
+      </p:sp>
+      <p:sp>
+        <p:nvSpPr>
+          <p:cNvPr id="3" name="Notes Placeholder 2"/>
+          <p:cNvSpPr>
+            <a:spLocks noGrp="1"/>
+          </p:cNvSpPr>
+          <p:nvPr>
+            <p:ph type="body" idx="1"/>
+          </p:nvPr>
+        </p:nvSpPr>
+        <p:spPr/>
+        <p:txBody>
+          <a:bodyPr/>
+          <a:lstStyle/>
+          <a:p>
+            <a:r>
+              <a:rPr lang="en-US" dirty="0">
+                <a:hlinkClick r:id="rId3"/>
+              </a:rPr>
+              <a:t>Introduction to Microsoft </a:t>
+            </a:r>
+            <a:r>
+              <a:rPr lang="en-US" dirty="0" err="1">
+                <a:hlinkClick r:id="rId3"/>
+              </a:rPr>
+              <a:t>Entra</a:t>
+            </a:r>
+            <a:r>
+              <a:rPr lang="en-US" dirty="0">
+                <a:hlinkClick r:id="rId3"/>
+              </a:rPr>
+              <a:t> ID Custom claims providers (part one) (youtube.com)</a:t>
+            </a:r>
+            <a:r>
+              <a:rPr lang="en-US" dirty="0"/>
+              <a:t>: https://www.youtube.com/watch?v=1tPA7B9ztz0&amp;list=PL3ZTgFEc7Lythpts59O9KOVuEDLWJLLmA&amp;index=6</a:t>
+            </a:r>
+          </a:p>
+          <a:p>
+            <a:endParaRPr lang="en-US" dirty="0"/>
+          </a:p>
+          <a:p>
+            <a:pPr marL="0" marR="0" lvl="0" indent="0" algn="l" defTabSz="914400" rtl="0" eaLnBrk="1" fontAlgn="auto" latinLnBrk="0" hangingPunct="1">
+              <a:lnSpc>
+                <a:spcPct val="100000"/>
+              </a:lnSpc>
+              <a:spcBef>
+                <a:spcPts val="0"/>
+              </a:spcBef>
+              <a:spcAft>
+                <a:spcPts val="0"/>
+              </a:spcAft>
+              <a:buClrTx/>
+              <a:buSzTx/>
+              <a:buFontTx/>
+              <a:buNone/>
+              <a:tabLst/>
+              <a:defRPr/>
+            </a:pPr>
+            <a:r>
+              <a:rPr lang="en-US" dirty="0">
+                <a:hlinkClick r:id="rId4"/>
+              </a:rPr>
+              <a:t>Configure Microsoft </a:t>
+            </a:r>
+            <a:r>
+              <a:rPr lang="en-US" dirty="0" err="1">
+                <a:hlinkClick r:id="rId4"/>
+              </a:rPr>
+              <a:t>Entra</a:t>
+            </a:r>
+            <a:r>
+              <a:rPr lang="en-US" dirty="0">
+                <a:hlinkClick r:id="rId4"/>
+              </a:rPr>
+              <a:t> ID Custom claims provider (part two) (youtube.com)</a:t>
+            </a:r>
+            <a:r>
+              <a:rPr lang="en-US" dirty="0"/>
+              <a:t>: https://www.youtube.com/watch?v=fxQGVIwX8_4&amp;list=PL3ZTgFEc7Lythpts59O9KOVuEDLWJLLmA&amp;index=7</a:t>
+            </a:r>
+          </a:p>
+          <a:p>
+            <a:pPr marL="0" marR="0" lvl="0" indent="0" algn="l" defTabSz="914400" rtl="0" eaLnBrk="1" fontAlgn="auto" latinLnBrk="0" hangingPunct="1">
+              <a:lnSpc>
+                <a:spcPct val="100000"/>
+              </a:lnSpc>
+              <a:spcBef>
+                <a:spcPts val="0"/>
+              </a:spcBef>
+              <a:spcAft>
+                <a:spcPts val="0"/>
+              </a:spcAft>
+              <a:buClrTx/>
+              <a:buSzTx/>
+              <a:buFontTx/>
+              <a:buNone/>
+              <a:tabLst/>
+              <a:defRPr/>
+            </a:pPr>
+            <a:endParaRPr lang="en-US" dirty="0"/>
+          </a:p>
+          <a:p>
+            <a:pPr marL="0" marR="0" lvl="0" indent="0" algn="l" defTabSz="914400" rtl="0" eaLnBrk="1" fontAlgn="auto" latinLnBrk="0" hangingPunct="1">
+              <a:lnSpc>
+                <a:spcPct val="100000"/>
+              </a:lnSpc>
+              <a:spcBef>
+                <a:spcPts val="0"/>
+              </a:spcBef>
+              <a:spcAft>
+                <a:spcPts val="0"/>
+              </a:spcAft>
+              <a:buClrTx/>
+              <a:buSzTx/>
+              <a:buFontTx/>
+              <a:buNone/>
+              <a:tabLst/>
+              <a:defRPr/>
+            </a:pPr>
+            <a:r>
+              <a:rPr lang="en-US" dirty="0">
+                <a:hlinkClick r:id="rId5"/>
+              </a:rPr>
+              <a:t>Custom claims provider overview - Microsoft identity platform | Microsoft Learn</a:t>
+            </a:r>
+            <a:r>
+              <a:rPr lang="en-US" dirty="0"/>
+              <a:t>: https://learn.microsoft.com/en-us/entra/identity-platform/custom-claims-provider-overview#token-issuance-start-event-listener</a:t>
+            </a:r>
+          </a:p>
+          <a:p>
+            <a:pPr marL="0" marR="0" lvl="0" indent="0" algn="l" defTabSz="914400" rtl="0" eaLnBrk="1" fontAlgn="auto" latinLnBrk="0" hangingPunct="1">
+              <a:lnSpc>
+                <a:spcPct val="100000"/>
+              </a:lnSpc>
+              <a:spcBef>
+                <a:spcPts val="0"/>
+              </a:spcBef>
+              <a:spcAft>
+                <a:spcPts val="0"/>
+              </a:spcAft>
+              <a:buClrTx/>
+              <a:buSzTx/>
+              <a:buFontTx/>
+              <a:buNone/>
+              <a:tabLst/>
+              <a:defRPr/>
+            </a:pPr>
+            <a:endParaRPr lang="en-US" dirty="0"/>
+          </a:p>
+          <a:p>
+            <a:pPr marL="0" marR="0" lvl="0" indent="0" algn="l" defTabSz="914400" rtl="0" eaLnBrk="1" fontAlgn="auto" latinLnBrk="0" hangingPunct="1">
+              <a:lnSpc>
+                <a:spcPct val="100000"/>
+              </a:lnSpc>
+              <a:spcBef>
+                <a:spcPts val="0"/>
+              </a:spcBef>
+              <a:spcAft>
+                <a:spcPts val="0"/>
+              </a:spcAft>
+              <a:buClrTx/>
+              <a:buSzTx/>
+              <a:buFontTx/>
+              <a:buNone/>
+              <a:tabLst/>
+              <a:defRPr/>
+            </a:pPr>
+            <a:r>
+              <a:rPr lang="en-US" dirty="0">
+                <a:hlinkClick r:id="rId6"/>
+              </a:rPr>
+              <a:t>Custom claims provider: Configure a token issuance event - Microsoft identity platform | Microsoft Learn</a:t>
+            </a:r>
+            <a:r>
+              <a:rPr lang="en-US" dirty="0"/>
+              <a:t>: https://learn.microsoft.com/en-us/entra/identity-platform/custom-extension-tokenissuancestart-configuration?tabs=azure-portal%2Cworkforce-tenant</a:t>
+            </a:r>
+          </a:p>
+          <a:p>
+            <a:endParaRPr lang="en-US" dirty="0"/>
+          </a:p>
+          <a:p>
+            <a:r>
+              <a:rPr lang="en-US" dirty="0">
+                <a:hlinkClick r:id="rId7"/>
+              </a:rPr>
+              <a:t>Custom claims provider reference - Microsoft identity platform | Microsoft Learn</a:t>
+            </a:r>
+            <a:r>
+              <a:rPr lang="en-US" dirty="0"/>
+              <a:t>: https://learn.microsoft.com/en-us/entra/identity-platform/custom-claims-provider-reference</a:t>
+            </a:r>
+          </a:p>
+          <a:p>
+            <a:endParaRPr lang="en-US" dirty="0"/>
           </a:p>
         </p:txBody>
       </p:sp>
@@ -4070,6 +4374,189 @@
     <p:extLst>
       <p:ext uri="{BB962C8B-B14F-4D97-AF65-F5344CB8AC3E}">
         <p14:creationId xmlns:p14="http://schemas.microsoft.com/office/powerpoint/2010/main" val="27716308"/>
+      </p:ext>
+    </p:extLst>
+  </p:cSld>
+  <p:clrMapOvr>
+    <a:masterClrMapping/>
+  </p:clrMapOvr>
+</p:notes>
+</file>
+
+<file path=ppt/notesSlides/notesSlide4.xml><?xml version="1.0" encoding="utf-8"?>
+<p:notes xmlns:a="http://schemas.openxmlformats.org/drawingml/2006/main" xmlns:r="http://schemas.openxmlformats.org/officeDocument/2006/relationships" xmlns:p="http://schemas.openxmlformats.org/presentationml/2006/main">
+  <p:cSld>
+    <p:spTree>
+      <p:nvGrpSpPr>
+        <p:cNvPr id="1" name=""/>
+        <p:cNvGrpSpPr/>
+        <p:nvPr/>
+      </p:nvGrpSpPr>
+      <p:grpSpPr>
+        <a:xfrm>
+          <a:off x="0" y="0"/>
+          <a:ext cx="0" cy="0"/>
+          <a:chOff x="0" y="0"/>
+          <a:chExt cx="0" cy="0"/>
+        </a:xfrm>
+      </p:grpSpPr>
+      <p:sp>
+        <p:nvSpPr>
+          <p:cNvPr id="2" name="Slide Image Placeholder 1"/>
+          <p:cNvSpPr>
+            <a:spLocks noGrp="1" noRot="1" noChangeAspect="1"/>
+          </p:cNvSpPr>
+          <p:nvPr>
+            <p:ph type="sldImg"/>
+          </p:nvPr>
+        </p:nvSpPr>
+        <p:spPr/>
+      </p:sp>
+      <p:sp>
+        <p:nvSpPr>
+          <p:cNvPr id="3" name="Notes Placeholder 2"/>
+          <p:cNvSpPr>
+            <a:spLocks noGrp="1"/>
+          </p:cNvSpPr>
+          <p:nvPr>
+            <p:ph type="body" idx="1"/>
+          </p:nvPr>
+        </p:nvSpPr>
+        <p:spPr/>
+        <p:txBody>
+          <a:bodyPr/>
+          <a:lstStyle/>
+          <a:p>
+            <a:r>
+              <a:rPr lang="en-US" dirty="0">
+                <a:hlinkClick r:id="rId3"/>
+              </a:rPr>
+              <a:t>Troubleshoot a custom claims provider - Microsoft identity platform | Microsoft Learn</a:t>
+            </a:r>
+            <a:r>
+              <a:rPr lang="en-US" dirty="0"/>
+              <a:t>: </a:t>
+            </a:r>
+          </a:p>
+          <a:p>
+            <a:r>
+              <a:rPr lang="en-US" dirty="0"/>
+              <a:t>https://learn.microsoft.com/en-us/entra/identity-platform/custom-extension-troubleshoot?tabs=obtain-an-access-token#common-performance-improvements</a:t>
+            </a:r>
+          </a:p>
+        </p:txBody>
+      </p:sp>
+      <p:sp>
+        <p:nvSpPr>
+          <p:cNvPr id="4" name="Slide Number Placeholder 3"/>
+          <p:cNvSpPr>
+            <a:spLocks noGrp="1"/>
+          </p:cNvSpPr>
+          <p:nvPr>
+            <p:ph type="sldNum" sz="quarter" idx="5"/>
+          </p:nvPr>
+        </p:nvSpPr>
+        <p:spPr/>
+        <p:txBody>
+          <a:bodyPr/>
+          <a:lstStyle/>
+          <a:p>
+            <a:fld id="{FFCBA6C1-B5D0-435C-97B3-E993F8FCD822}" type="slidenum">
+              <a:rPr lang="en-US" smtClean="0"/>
+              <a:t>4</a:t>
+            </a:fld>
+            <a:endParaRPr lang="en-US"/>
+          </a:p>
+        </p:txBody>
+      </p:sp>
+    </p:spTree>
+    <p:extLst>
+      <p:ext uri="{BB962C8B-B14F-4D97-AF65-F5344CB8AC3E}">
+        <p14:creationId xmlns:p14="http://schemas.microsoft.com/office/powerpoint/2010/main" val="3118995061"/>
+      </p:ext>
+    </p:extLst>
+  </p:cSld>
+  <p:clrMapOvr>
+    <a:masterClrMapping/>
+  </p:clrMapOvr>
+</p:notes>
+</file>
+
+<file path=ppt/notesSlides/notesSlide5.xml><?xml version="1.0" encoding="utf-8"?>
+<p:notes xmlns:a="http://schemas.openxmlformats.org/drawingml/2006/main" xmlns:r="http://schemas.openxmlformats.org/officeDocument/2006/relationships" xmlns:p="http://schemas.openxmlformats.org/presentationml/2006/main">
+  <p:cSld>
+    <p:spTree>
+      <p:nvGrpSpPr>
+        <p:cNvPr id="1" name=""/>
+        <p:cNvGrpSpPr/>
+        <p:nvPr/>
+      </p:nvGrpSpPr>
+      <p:grpSpPr>
+        <a:xfrm>
+          <a:off x="0" y="0"/>
+          <a:ext cx="0" cy="0"/>
+          <a:chOff x="0" y="0"/>
+          <a:chExt cx="0" cy="0"/>
+        </a:xfrm>
+      </p:grpSpPr>
+      <p:sp>
+        <p:nvSpPr>
+          <p:cNvPr id="2" name="Slide Image Placeholder 1"/>
+          <p:cNvSpPr>
+            <a:spLocks noGrp="1" noRot="1" noChangeAspect="1"/>
+          </p:cNvSpPr>
+          <p:nvPr>
+            <p:ph type="sldImg"/>
+          </p:nvPr>
+        </p:nvSpPr>
+        <p:spPr/>
+      </p:sp>
+      <p:sp>
+        <p:nvSpPr>
+          <p:cNvPr id="3" name="Notes Placeholder 2"/>
+          <p:cNvSpPr>
+            <a:spLocks noGrp="1"/>
+          </p:cNvSpPr>
+          <p:nvPr>
+            <p:ph type="body" idx="1"/>
+          </p:nvPr>
+        </p:nvSpPr>
+        <p:spPr/>
+        <p:txBody>
+          <a:bodyPr/>
+          <a:lstStyle/>
+          <a:p>
+            <a:endParaRPr lang="en-US" dirty="0"/>
+          </a:p>
+        </p:txBody>
+      </p:sp>
+      <p:sp>
+        <p:nvSpPr>
+          <p:cNvPr id="4" name="Slide Number Placeholder 3"/>
+          <p:cNvSpPr>
+            <a:spLocks noGrp="1"/>
+          </p:cNvSpPr>
+          <p:nvPr>
+            <p:ph type="sldNum" sz="quarter" idx="5"/>
+          </p:nvPr>
+        </p:nvSpPr>
+        <p:spPr/>
+        <p:txBody>
+          <a:bodyPr/>
+          <a:lstStyle/>
+          <a:p>
+            <a:fld id="{FFCBA6C1-B5D0-435C-97B3-E993F8FCD822}" type="slidenum">
+              <a:rPr lang="en-US" smtClean="0"/>
+              <a:t>5</a:t>
+            </a:fld>
+            <a:endParaRPr lang="en-US"/>
+          </a:p>
+        </p:txBody>
+      </p:sp>
+    </p:spTree>
+    <p:extLst>
+      <p:ext uri="{BB962C8B-B14F-4D97-AF65-F5344CB8AC3E}">
+        <p14:creationId xmlns:p14="http://schemas.microsoft.com/office/powerpoint/2010/main" val="2343084512"/>
       </p:ext>
     </p:extLst>
   </p:cSld>
@@ -7702,7 +8189,7 @@
           </p:nvPr>
         </p:nvPicPr>
         <p:blipFill>
-          <a:blip r:embed="rId2">
+          <a:blip r:embed="rId3">
             <a:extLst>
               <a:ext uri="{28A0092B-C50C-407E-A947-70E740481C1C}">
                 <a14:useLocalDpi xmlns:a14="http://schemas.microsoft.com/office/drawing/2010/main" val="0"/>
@@ -7746,7 +8233,7 @@
         </p:xfrm>
         <a:graphic>
           <a:graphicData uri="http://schemas.openxmlformats.org/drawingml/2006/diagram">
-            <dgm:relIds xmlns:dgm="http://schemas.openxmlformats.org/drawingml/2006/diagram" xmlns:r="http://schemas.openxmlformats.org/officeDocument/2006/relationships" r:dm="rId3" r:lo="rId4" r:qs="rId5" r:cs="rId6"/>
+            <dgm:relIds xmlns:dgm="http://schemas.openxmlformats.org/drawingml/2006/diagram" xmlns:r="http://schemas.openxmlformats.org/officeDocument/2006/relationships" r:dm="rId4" r:lo="rId5" r:qs="rId6" r:cs="rId7"/>
           </a:graphicData>
         </a:graphic>
       </p:graphicFrame>
@@ -7832,56 +8319,107 @@
         </p:spPr>
         <p:txBody>
           <a:bodyPr>
-            <a:normAutofit/>
+            <a:normAutofit fontScale="77500" lnSpcReduction="20000"/>
           </a:bodyPr>
           <a:lstStyle/>
           <a:p>
-            <a:r>
-              <a:rPr lang="en-US" sz="2400" dirty="0" err="1"/>
+            <a:pPr marL="514350" indent="-514350">
+              <a:buFont typeface="+mj-lt"/>
+              <a:buAutoNum type="arabicPeriod"/>
+            </a:pPr>
+            <a:r>
+              <a:rPr lang="en-US" dirty="0"/>
+              <a:t>Request a token by calling  https://login.microsoftonline.com/&lt;</a:t>
+            </a:r>
+            <a:r>
+              <a:rPr lang="en-US" dirty="0" err="1"/>
+              <a:t>tenantid</a:t>
+            </a:r>
+            <a:r>
+              <a:rPr lang="en-US" dirty="0"/>
+              <a:t>&gt;/oath2...</a:t>
+            </a:r>
+          </a:p>
+          <a:p>
+            <a:pPr marL="514350" indent="-514350">
+              <a:buFont typeface="+mj-lt"/>
+              <a:buAutoNum type="arabicPeriod"/>
+            </a:pPr>
+            <a:r>
+              <a:rPr lang="en-US" dirty="0"/>
+              <a:t>Custom Authentication Extension triggers an </a:t>
+            </a:r>
+            <a:r>
+              <a:rPr lang="en-US" dirty="0" err="1"/>
+              <a:t>OnTokenIssuanceStart</a:t>
+            </a:r>
+            <a:r>
+              <a:rPr lang="en-US" dirty="0"/>
+              <a:t> event.</a:t>
+            </a:r>
+          </a:p>
+          <a:p>
+            <a:pPr marL="514350" indent="-514350">
+              <a:buFont typeface="+mj-lt"/>
+              <a:buAutoNum type="arabicPeriod"/>
+            </a:pPr>
+            <a:r>
+              <a:rPr lang="en-US" dirty="0"/>
+              <a:t>Custom claims API calls </a:t>
+            </a:r>
+            <a:r>
+              <a:rPr lang="en-US" dirty="0" err="1"/>
+              <a:t>sql</a:t>
+            </a:r>
+            <a:r>
+              <a:rPr lang="en-US" dirty="0"/>
+              <a:t> </a:t>
+            </a:r>
+            <a:r>
+              <a:rPr lang="en-US" dirty="0" err="1"/>
+              <a:t>db</a:t>
+            </a:r>
+            <a:r>
+              <a:rPr lang="en-US" dirty="0"/>
+              <a:t> to retrieve the custom claims.</a:t>
+            </a:r>
+          </a:p>
+          <a:p>
+            <a:pPr marL="514350" indent="-514350">
+              <a:buFont typeface="+mj-lt"/>
+              <a:buAutoNum type="arabicPeriod"/>
+            </a:pPr>
+            <a:r>
+              <a:rPr lang="en-US" dirty="0"/>
+              <a:t>Return response to </a:t>
+            </a:r>
+            <a:r>
+              <a:rPr lang="en-US" dirty="0" err="1"/>
               <a:t>Entra</a:t>
             </a:r>
             <a:r>
-              <a:rPr lang="en-US" sz="2400" dirty="0"/>
-              <a:t> Custom Authentication Extension.</a:t>
-            </a:r>
-          </a:p>
-          <a:p>
-            <a:r>
-              <a:rPr lang="en-US" sz="2400" dirty="0"/>
-              <a:t>Custom Claims API listens for the </a:t>
-            </a:r>
-            <a:r>
-              <a:rPr lang="en-US" sz="2400" dirty="0" err="1"/>
-              <a:t>OnTokeIssuanceStart</a:t>
-            </a:r>
-            <a:r>
-              <a:rPr lang="en-US" sz="2400" dirty="0"/>
-              <a:t> event.</a:t>
-            </a:r>
-          </a:p>
-          <a:p>
-            <a:r>
-              <a:rPr lang="en-US" sz="2400" dirty="0"/>
-              <a:t>Get user claims from SQL</a:t>
-            </a:r>
-          </a:p>
-          <a:p>
-            <a:r>
-              <a:rPr lang="en-US" sz="2400" dirty="0"/>
-              <a:t>Transaction needs to be completed in 2 seconds or the Authentication fails.</a:t>
-            </a:r>
-          </a:p>
-          <a:p>
-            <a:endParaRPr lang="en-US" dirty="0"/>
+              <a:rPr lang="en-US" dirty="0"/>
+              <a:t> ID within 2 seconds timeout limit or authentication fails.</a:t>
+            </a:r>
+          </a:p>
+          <a:p>
+            <a:pPr marL="514350" indent="-514350">
+              <a:buFont typeface="+mj-lt"/>
+              <a:buAutoNum type="arabicPeriod"/>
+            </a:pPr>
+            <a:r>
+              <a:rPr lang="en-US" dirty="0"/>
+              <a:t>Redirect to jwt.ms with the token provided.</a:t>
+            </a:r>
           </a:p>
         </p:txBody>
       </p:sp>
       <p:pic>
         <p:nvPicPr>
-          <p:cNvPr id="7" name="Picture 6">
+          <p:cNvPr id="8" name="Picture 7">
             <a:extLst>
               <a:ext uri="{FF2B5EF4-FFF2-40B4-BE49-F238E27FC236}">
-                <a16:creationId xmlns:a16="http://schemas.microsoft.com/office/drawing/2014/main" id="{3F27152E-46BD-EB43-B099-BEEDBD6B53F1}"/>
+                <a16:creationId xmlns:a16="http://schemas.microsoft.com/office/drawing/2014/main" id="{1B4CDE6D-909A-D337-575F-188C89ACEF8C}"/>
               </a:ext>
             </a:extLst>
           </p:cNvPr>
@@ -7891,15 +8429,15 @@
           <p:nvPr/>
         </p:nvPicPr>
         <p:blipFill>
-          <a:blip r:embed="rId2"/>
+          <a:blip r:embed="rId3"/>
           <a:stretch>
             <a:fillRect/>
           </a:stretch>
         </p:blipFill>
         <p:spPr>
           <a:xfrm>
-            <a:off x="5110843" y="2820194"/>
-            <a:ext cx="6242957" cy="2362200"/>
+            <a:off x="5110843" y="2689565"/>
+            <a:ext cx="6242957" cy="2623457"/>
           </a:xfrm>
           <a:prstGeom prst="rect">
             <a:avLst/>

</xml_diff>